<commit_message>
Added a slide to the powerpoint.
</commit_message>
<xml_diff>
--- a/Präsentation.pptx
+++ b/Präsentation.pptx
@@ -264,7 +264,7 @@
           <a:p>
             <a:fld id="{EA00E101-0161-444B-9CCE-BCCF91C91E2C}" type="datetimeFigureOut">
               <a:rPr lang="de-AT" smtClean="0"/>
-              <a:t>25.04.2022</a:t>
+              <a:t>26.04.2022</a:t>
             </a:fld>
             <a:endParaRPr lang="de-AT"/>
           </a:p>
@@ -464,7 +464,7 @@
           <a:p>
             <a:fld id="{EA00E101-0161-444B-9CCE-BCCF91C91E2C}" type="datetimeFigureOut">
               <a:rPr lang="de-AT" smtClean="0"/>
-              <a:t>25.04.2022</a:t>
+              <a:t>26.04.2022</a:t>
             </a:fld>
             <a:endParaRPr lang="de-AT"/>
           </a:p>
@@ -674,7 +674,7 @@
           <a:p>
             <a:fld id="{EA00E101-0161-444B-9CCE-BCCF91C91E2C}" type="datetimeFigureOut">
               <a:rPr lang="de-AT" smtClean="0"/>
-              <a:t>25.04.2022</a:t>
+              <a:t>26.04.2022</a:t>
             </a:fld>
             <a:endParaRPr lang="de-AT"/>
           </a:p>
@@ -874,7 +874,7 @@
           <a:p>
             <a:fld id="{EA00E101-0161-444B-9CCE-BCCF91C91E2C}" type="datetimeFigureOut">
               <a:rPr lang="de-AT" smtClean="0"/>
-              <a:t>25.04.2022</a:t>
+              <a:t>26.04.2022</a:t>
             </a:fld>
             <a:endParaRPr lang="de-AT"/>
           </a:p>
@@ -1150,7 +1150,7 @@
           <a:p>
             <a:fld id="{EA00E101-0161-444B-9CCE-BCCF91C91E2C}" type="datetimeFigureOut">
               <a:rPr lang="de-AT" smtClean="0"/>
-              <a:t>25.04.2022</a:t>
+              <a:t>26.04.2022</a:t>
             </a:fld>
             <a:endParaRPr lang="de-AT"/>
           </a:p>
@@ -1418,7 +1418,7 @@
           <a:p>
             <a:fld id="{EA00E101-0161-444B-9CCE-BCCF91C91E2C}" type="datetimeFigureOut">
               <a:rPr lang="de-AT" smtClean="0"/>
-              <a:t>25.04.2022</a:t>
+              <a:t>26.04.2022</a:t>
             </a:fld>
             <a:endParaRPr lang="de-AT"/>
           </a:p>
@@ -1833,7 +1833,7 @@
           <a:p>
             <a:fld id="{EA00E101-0161-444B-9CCE-BCCF91C91E2C}" type="datetimeFigureOut">
               <a:rPr lang="de-AT" smtClean="0"/>
-              <a:t>25.04.2022</a:t>
+              <a:t>26.04.2022</a:t>
             </a:fld>
             <a:endParaRPr lang="de-AT"/>
           </a:p>
@@ -1975,7 +1975,7 @@
           <a:p>
             <a:fld id="{EA00E101-0161-444B-9CCE-BCCF91C91E2C}" type="datetimeFigureOut">
               <a:rPr lang="de-AT" smtClean="0"/>
-              <a:t>25.04.2022</a:t>
+              <a:t>26.04.2022</a:t>
             </a:fld>
             <a:endParaRPr lang="de-AT"/>
           </a:p>
@@ -2088,7 +2088,7 @@
           <a:p>
             <a:fld id="{EA00E101-0161-444B-9CCE-BCCF91C91E2C}" type="datetimeFigureOut">
               <a:rPr lang="de-AT" smtClean="0"/>
-              <a:t>25.04.2022</a:t>
+              <a:t>26.04.2022</a:t>
             </a:fld>
             <a:endParaRPr lang="de-AT"/>
           </a:p>
@@ -2401,7 +2401,7 @@
           <a:p>
             <a:fld id="{EA00E101-0161-444B-9CCE-BCCF91C91E2C}" type="datetimeFigureOut">
               <a:rPr lang="de-AT" smtClean="0"/>
-              <a:t>25.04.2022</a:t>
+              <a:t>26.04.2022</a:t>
             </a:fld>
             <a:endParaRPr lang="de-AT"/>
           </a:p>
@@ -2690,7 +2690,7 @@
           <a:p>
             <a:fld id="{EA00E101-0161-444B-9CCE-BCCF91C91E2C}" type="datetimeFigureOut">
               <a:rPr lang="de-AT" smtClean="0"/>
-              <a:t>25.04.2022</a:t>
+              <a:t>26.04.2022</a:t>
             </a:fld>
             <a:endParaRPr lang="de-AT"/>
           </a:p>
@@ -2933,7 +2933,7 @@
           <a:p>
             <a:fld id="{EA00E101-0161-444B-9CCE-BCCF91C91E2C}" type="datetimeFigureOut">
               <a:rPr lang="de-AT" smtClean="0"/>
-              <a:t>25.04.2022</a:t>
+              <a:t>26.04.2022</a:t>
             </a:fld>
             <a:endParaRPr lang="de-AT"/>
           </a:p>
@@ -8164,8 +8164,158 @@
               </a:rPr>
               <a:t> </a:t>
             </a:r>
-          </a:p>
-          <a:p>
+            <a:r>
+              <a:rPr lang="de-DE" sz="1800" dirty="0" err="1">
+                <a:solidFill>
+                  <a:schemeClr val="tx2"/>
+                </a:solidFill>
+              </a:rPr>
+              <a:t>Connected</a:t>
+            </a:r>
+            <a:r>
+              <a:rPr lang="de-DE" sz="1800" dirty="0">
+                <a:solidFill>
+                  <a:schemeClr val="tx2"/>
+                </a:solidFill>
+              </a:rPr>
+              <a:t> via links</a:t>
+            </a:r>
+          </a:p>
+          <a:p>
+            <a:r>
+              <a:rPr lang="de-DE" sz="1800" dirty="0">
+                <a:solidFill>
+                  <a:schemeClr val="tx2"/>
+                </a:solidFill>
+              </a:rPr>
+              <a:t>Link </a:t>
+            </a:r>
+            <a:r>
+              <a:rPr lang="de-DE" sz="1800" dirty="0" err="1">
+                <a:solidFill>
+                  <a:schemeClr val="tx2"/>
+                </a:solidFill>
+              </a:rPr>
+              <a:t>to</a:t>
+            </a:r>
+            <a:r>
+              <a:rPr lang="de-DE" sz="1800" dirty="0">
+                <a:solidFill>
+                  <a:schemeClr val="tx2"/>
+                </a:solidFill>
+              </a:rPr>
+              <a:t> link </a:t>
+            </a:r>
+            <a:r>
+              <a:rPr lang="de-DE" sz="1800" dirty="0" err="1">
+                <a:solidFill>
+                  <a:schemeClr val="tx2"/>
+                </a:solidFill>
+              </a:rPr>
+              <a:t>connection</a:t>
+            </a:r>
+            <a:endParaRPr lang="de-DE" sz="1800" dirty="0">
+              <a:solidFill>
+                <a:schemeClr val="tx2"/>
+              </a:solidFill>
+            </a:endParaRPr>
+          </a:p>
+          <a:p>
+            <a:r>
+              <a:rPr lang="de-DE" sz="1800" dirty="0" err="1">
+                <a:solidFill>
+                  <a:schemeClr val="tx2"/>
+                </a:solidFill>
+              </a:rPr>
+              <a:t>second</a:t>
+            </a:r>
+            <a:r>
+              <a:rPr lang="de-DE" sz="1800" dirty="0">
+                <a:solidFill>
+                  <a:schemeClr val="tx2"/>
+                </a:solidFill>
+              </a:rPr>
+              <a:t> most-</a:t>
+            </a:r>
+            <a:r>
+              <a:rPr lang="de-DE" sz="1800" dirty="0" err="1">
+                <a:solidFill>
+                  <a:schemeClr val="tx2"/>
+                </a:solidFill>
+              </a:rPr>
+              <a:t>used</a:t>
+            </a:r>
+            <a:r>
+              <a:rPr lang="de-DE" sz="1800" dirty="0">
+                <a:solidFill>
+                  <a:schemeClr val="tx2"/>
+                </a:solidFill>
+              </a:rPr>
+              <a:t> </a:t>
+            </a:r>
+            <a:r>
+              <a:rPr lang="de-DE" sz="1800" dirty="0" err="1">
+                <a:solidFill>
+                  <a:schemeClr val="tx2"/>
+                </a:solidFill>
+              </a:rPr>
+              <a:t>data</a:t>
+            </a:r>
+            <a:r>
+              <a:rPr lang="de-DE" sz="1800" dirty="0">
+                <a:solidFill>
+                  <a:schemeClr val="tx2"/>
+                </a:solidFill>
+              </a:rPr>
+              <a:t> </a:t>
+            </a:r>
+            <a:r>
+              <a:rPr lang="de-DE" sz="1800" dirty="0" err="1">
+                <a:solidFill>
+                  <a:schemeClr val="tx2"/>
+                </a:solidFill>
+              </a:rPr>
+              <a:t>structure</a:t>
+            </a:r>
+            <a:endParaRPr lang="de-DE" sz="1800" dirty="0">
+              <a:solidFill>
+                <a:schemeClr val="tx2"/>
+              </a:solidFill>
+            </a:endParaRPr>
+          </a:p>
+          <a:p>
+            <a:r>
+              <a:rPr lang="de-DE" sz="1800" dirty="0">
+                <a:solidFill>
+                  <a:schemeClr val="tx2"/>
+                </a:solidFill>
+              </a:rPr>
+              <a:t>Linear </a:t>
+            </a:r>
+            <a:r>
+              <a:rPr lang="de-DE" sz="1800" dirty="0" err="1">
+                <a:solidFill>
+                  <a:schemeClr val="tx2"/>
+                </a:solidFill>
+              </a:rPr>
+              <a:t>data</a:t>
+            </a:r>
+            <a:r>
+              <a:rPr lang="de-DE" sz="1800" dirty="0">
+                <a:solidFill>
+                  <a:schemeClr val="tx2"/>
+                </a:solidFill>
+              </a:rPr>
+              <a:t> </a:t>
+            </a:r>
+            <a:r>
+              <a:rPr lang="de-DE" sz="1800" dirty="0" err="1">
+                <a:solidFill>
+                  <a:schemeClr val="tx2"/>
+                </a:solidFill>
+              </a:rPr>
+              <a:t>structure</a:t>
+            </a:r>
             <a:endParaRPr lang="de-DE" sz="1800" dirty="0">
               <a:solidFill>
                 <a:schemeClr val="tx2"/>

</xml_diff>